<commit_message>
Reuploaded fig2 and 3 in Developer guide
</commit_message>
<xml_diff>
--- a/docs/diagrams/LogicComponentSequenceDiagram.pptx
+++ b/docs/diagrams/LogicComponentSequenceDiagram.pptx
@@ -208,7 +208,7 @@
           <a:p>
             <a:fld id="{F5CC4B3F-88C1-4FFA-B1B6-F41C21DC6924}" type="datetimeFigureOut">
               <a:rPr lang="en-US" smtClean="0"/>
-              <a:t>12/15/2018</a:t>
+              <a:t>2/25/2019</a:t>
             </a:fld>
             <a:endParaRPr lang="en-US"/>
           </a:p>
@@ -738,7 +738,7 @@
           <a:p>
             <a:fld id="{78C97017-6FC3-485B-9764-EAC9E56C1D49}" type="datetimeFigureOut">
               <a:rPr lang="en-US" smtClean="0"/>
-              <a:t>12/15/2018</a:t>
+              <a:t>2/25/2019</a:t>
             </a:fld>
             <a:endParaRPr lang="en-US"/>
           </a:p>
@@ -906,7 +906,7 @@
           <a:p>
             <a:fld id="{78C97017-6FC3-485B-9764-EAC9E56C1D49}" type="datetimeFigureOut">
               <a:rPr lang="en-US" smtClean="0"/>
-              <a:t>12/15/2018</a:t>
+              <a:t>2/25/2019</a:t>
             </a:fld>
             <a:endParaRPr lang="en-US"/>
           </a:p>
@@ -1084,7 +1084,7 @@
           <a:p>
             <a:fld id="{78C97017-6FC3-485B-9764-EAC9E56C1D49}" type="datetimeFigureOut">
               <a:rPr lang="en-US" smtClean="0"/>
-              <a:t>12/15/2018</a:t>
+              <a:t>2/25/2019</a:t>
             </a:fld>
             <a:endParaRPr lang="en-US"/>
           </a:p>
@@ -1252,7 +1252,7 @@
           <a:p>
             <a:fld id="{78C97017-6FC3-485B-9764-EAC9E56C1D49}" type="datetimeFigureOut">
               <a:rPr lang="en-US" smtClean="0"/>
-              <a:t>12/15/2018</a:t>
+              <a:t>2/25/2019</a:t>
             </a:fld>
             <a:endParaRPr lang="en-US"/>
           </a:p>
@@ -1497,7 +1497,7 @@
           <a:p>
             <a:fld id="{78C97017-6FC3-485B-9764-EAC9E56C1D49}" type="datetimeFigureOut">
               <a:rPr lang="en-US" smtClean="0"/>
-              <a:t>12/15/2018</a:t>
+              <a:t>2/25/2019</a:t>
             </a:fld>
             <a:endParaRPr lang="en-US"/>
           </a:p>
@@ -1782,7 +1782,7 @@
           <a:p>
             <a:fld id="{78C97017-6FC3-485B-9764-EAC9E56C1D49}" type="datetimeFigureOut">
               <a:rPr lang="en-US" smtClean="0"/>
-              <a:t>12/15/2018</a:t>
+              <a:t>2/25/2019</a:t>
             </a:fld>
             <a:endParaRPr lang="en-US"/>
           </a:p>
@@ -2201,7 +2201,7 @@
           <a:p>
             <a:fld id="{78C97017-6FC3-485B-9764-EAC9E56C1D49}" type="datetimeFigureOut">
               <a:rPr lang="en-US" smtClean="0"/>
-              <a:t>12/15/2018</a:t>
+              <a:t>2/25/2019</a:t>
             </a:fld>
             <a:endParaRPr lang="en-US"/>
           </a:p>
@@ -2318,7 +2318,7 @@
           <a:p>
             <a:fld id="{78C97017-6FC3-485B-9764-EAC9E56C1D49}" type="datetimeFigureOut">
               <a:rPr lang="en-US" smtClean="0"/>
-              <a:t>12/15/2018</a:t>
+              <a:t>2/25/2019</a:t>
             </a:fld>
             <a:endParaRPr lang="en-US"/>
           </a:p>
@@ -2413,7 +2413,7 @@
           <a:p>
             <a:fld id="{78C97017-6FC3-485B-9764-EAC9E56C1D49}" type="datetimeFigureOut">
               <a:rPr lang="en-US" smtClean="0"/>
-              <a:t>12/15/2018</a:t>
+              <a:t>2/25/2019</a:t>
             </a:fld>
             <a:endParaRPr lang="en-US"/>
           </a:p>
@@ -2688,7 +2688,7 @@
           <a:p>
             <a:fld id="{78C97017-6FC3-485B-9764-EAC9E56C1D49}" type="datetimeFigureOut">
               <a:rPr lang="en-US" smtClean="0"/>
-              <a:t>12/15/2018</a:t>
+              <a:t>2/25/2019</a:t>
             </a:fld>
             <a:endParaRPr lang="en-US"/>
           </a:p>
@@ -2940,7 +2940,7 @@
           <a:p>
             <a:fld id="{78C97017-6FC3-485B-9764-EAC9E56C1D49}" type="datetimeFigureOut">
               <a:rPr lang="en-US" smtClean="0"/>
-              <a:t>12/15/2018</a:t>
+              <a:t>2/25/2019</a:t>
             </a:fld>
             <a:endParaRPr lang="en-US"/>
           </a:p>
@@ -3151,7 +3151,7 @@
           <a:p>
             <a:fld id="{78C97017-6FC3-485B-9764-EAC9E56C1D49}" type="datetimeFigureOut">
               <a:rPr lang="en-US" smtClean="0"/>
-              <a:t>12/15/2018</a:t>
+              <a:t>2/25/2019</a:t>
             </a:fld>
             <a:endParaRPr lang="en-US"/>
           </a:p>
@@ -4397,7 +4397,7 @@
                   <a:srgbClr val="7030A0"/>
                 </a:solidFill>
               </a:rPr>
-              <a:t>deletePerson</a:t>
+              <a:t>deleteRecord</a:t>
             </a:r>
             <a:r>
               <a:rPr lang="en-US" sz="1400" dirty="0">
@@ -4405,7 +4405,7 @@
                   <a:srgbClr val="7030A0"/>
                 </a:solidFill>
               </a:rPr>
-              <a:t>(p)</a:t>
+              <a:t>(r)</a:t>
             </a:r>
           </a:p>
         </p:txBody>
@@ -4763,7 +4763,7 @@
                   </a:schemeClr>
                 </a:solidFill>
               </a:rPr>
-              <a:t>saveAddressBook</a:t>
+              <a:t>saveFinanceLog</a:t>
             </a:r>
             <a:r>
               <a:rPr lang="en-US" sz="1400" dirty="0">
@@ -4783,7 +4783,7 @@
                   </a:schemeClr>
                 </a:solidFill>
               </a:rPr>
-              <a:t>AddressBook</a:t>
+              <a:t>FinanceLog</a:t>
             </a:r>
             <a:r>
               <a:rPr lang="en-US" sz="1400" dirty="0">

</xml_diff>

<commit_message>
Add use cases, new sequential diagrams and the new title to DG
</commit_message>
<xml_diff>
--- a/docs/diagrams/LogicComponentSequenceDiagram.pptx
+++ b/docs/diagrams/LogicComponentSequenceDiagram.pptx
@@ -208,7 +208,7 @@
           <a:p>
             <a:fld id="{F5CC4B3F-88C1-4FFA-B1B6-F41C21DC6924}" type="datetimeFigureOut">
               <a:rPr lang="en-US" smtClean="0"/>
-              <a:t>12/15/2018</a:t>
+              <a:t>3/6/2019</a:t>
             </a:fld>
             <a:endParaRPr lang="en-US"/>
           </a:p>
@@ -738,7 +738,7 @@
           <a:p>
             <a:fld id="{78C97017-6FC3-485B-9764-EAC9E56C1D49}" type="datetimeFigureOut">
               <a:rPr lang="en-US" smtClean="0"/>
-              <a:t>12/15/2018</a:t>
+              <a:t>3/6/2019</a:t>
             </a:fld>
             <a:endParaRPr lang="en-US"/>
           </a:p>
@@ -906,7 +906,7 @@
           <a:p>
             <a:fld id="{78C97017-6FC3-485B-9764-EAC9E56C1D49}" type="datetimeFigureOut">
               <a:rPr lang="en-US" smtClean="0"/>
-              <a:t>12/15/2018</a:t>
+              <a:t>3/6/2019</a:t>
             </a:fld>
             <a:endParaRPr lang="en-US"/>
           </a:p>
@@ -1084,7 +1084,7 @@
           <a:p>
             <a:fld id="{78C97017-6FC3-485B-9764-EAC9E56C1D49}" type="datetimeFigureOut">
               <a:rPr lang="en-US" smtClean="0"/>
-              <a:t>12/15/2018</a:t>
+              <a:t>3/6/2019</a:t>
             </a:fld>
             <a:endParaRPr lang="en-US"/>
           </a:p>
@@ -1252,7 +1252,7 @@
           <a:p>
             <a:fld id="{78C97017-6FC3-485B-9764-EAC9E56C1D49}" type="datetimeFigureOut">
               <a:rPr lang="en-US" smtClean="0"/>
-              <a:t>12/15/2018</a:t>
+              <a:t>3/6/2019</a:t>
             </a:fld>
             <a:endParaRPr lang="en-US"/>
           </a:p>
@@ -1497,7 +1497,7 @@
           <a:p>
             <a:fld id="{78C97017-6FC3-485B-9764-EAC9E56C1D49}" type="datetimeFigureOut">
               <a:rPr lang="en-US" smtClean="0"/>
-              <a:t>12/15/2018</a:t>
+              <a:t>3/6/2019</a:t>
             </a:fld>
             <a:endParaRPr lang="en-US"/>
           </a:p>
@@ -1782,7 +1782,7 @@
           <a:p>
             <a:fld id="{78C97017-6FC3-485B-9764-EAC9E56C1D49}" type="datetimeFigureOut">
               <a:rPr lang="en-US" smtClean="0"/>
-              <a:t>12/15/2018</a:t>
+              <a:t>3/6/2019</a:t>
             </a:fld>
             <a:endParaRPr lang="en-US"/>
           </a:p>
@@ -2201,7 +2201,7 @@
           <a:p>
             <a:fld id="{78C97017-6FC3-485B-9764-EAC9E56C1D49}" type="datetimeFigureOut">
               <a:rPr lang="en-US" smtClean="0"/>
-              <a:t>12/15/2018</a:t>
+              <a:t>3/6/2019</a:t>
             </a:fld>
             <a:endParaRPr lang="en-US"/>
           </a:p>
@@ -2318,7 +2318,7 @@
           <a:p>
             <a:fld id="{78C97017-6FC3-485B-9764-EAC9E56C1D49}" type="datetimeFigureOut">
               <a:rPr lang="en-US" smtClean="0"/>
-              <a:t>12/15/2018</a:t>
+              <a:t>3/6/2019</a:t>
             </a:fld>
             <a:endParaRPr lang="en-US"/>
           </a:p>
@@ -2413,7 +2413,7 @@
           <a:p>
             <a:fld id="{78C97017-6FC3-485B-9764-EAC9E56C1D49}" type="datetimeFigureOut">
               <a:rPr lang="en-US" smtClean="0"/>
-              <a:t>12/15/2018</a:t>
+              <a:t>3/6/2019</a:t>
             </a:fld>
             <a:endParaRPr lang="en-US"/>
           </a:p>
@@ -2688,7 +2688,7 @@
           <a:p>
             <a:fld id="{78C97017-6FC3-485B-9764-EAC9E56C1D49}" type="datetimeFigureOut">
               <a:rPr lang="en-US" smtClean="0"/>
-              <a:t>12/15/2018</a:t>
+              <a:t>3/6/2019</a:t>
             </a:fld>
             <a:endParaRPr lang="en-US"/>
           </a:p>
@@ -2940,7 +2940,7 @@
           <a:p>
             <a:fld id="{78C97017-6FC3-485B-9764-EAC9E56C1D49}" type="datetimeFigureOut">
               <a:rPr lang="en-US" smtClean="0"/>
-              <a:t>12/15/2018</a:t>
+              <a:t>3/6/2019</a:t>
             </a:fld>
             <a:endParaRPr lang="en-US"/>
           </a:p>
@@ -3151,7 +3151,7 @@
           <a:p>
             <a:fld id="{78C97017-6FC3-485B-9764-EAC9E56C1D49}" type="datetimeFigureOut">
               <a:rPr lang="en-US" smtClean="0"/>
-              <a:t>12/15/2018</a:t>
+              <a:t>3/6/2019</a:t>
             </a:fld>
             <a:endParaRPr lang="en-US"/>
           </a:p>
@@ -4236,8 +4236,8 @@
         </p:nvSpPr>
         <p:spPr>
           <a:xfrm>
-            <a:off x="1345305" y="2989204"/>
-            <a:ext cx="860170" cy="215444"/>
+            <a:off x="968234" y="2989204"/>
+            <a:ext cx="1515617" cy="215444"/>
           </a:xfrm>
           <a:prstGeom prst="rect">
             <a:avLst/>
@@ -4252,8 +4252,12 @@
           <a:p>
             <a:pPr algn="ctr"/>
             <a:r>
+              <a:rPr lang="en-US" sz="1400" dirty="0" err="1"/>
+              <a:t>deletecustomer</a:t>
+            </a:r>
+            <a:r>
               <a:rPr lang="en-US" sz="1400" dirty="0"/>
-              <a:t>delete 1</a:t>
+              <a:t> 1</a:t>
             </a:r>
           </a:p>
         </p:txBody>
@@ -4304,8 +4308,8 @@
         </p:nvSpPr>
         <p:spPr>
           <a:xfrm>
-            <a:off x="2552219" y="3082866"/>
-            <a:ext cx="1424846" cy="215444"/>
+            <a:off x="2492258" y="3082866"/>
+            <a:ext cx="1542753" cy="430887"/>
           </a:xfrm>
           <a:prstGeom prst="rect">
             <a:avLst/>
@@ -4325,7 +4329,34 @@
                   <a:srgbClr val="0070C0"/>
                 </a:solidFill>
               </a:rPr>
-              <a:t>execute(“delete 1”)</a:t>
+              <a:t>execute(</a:t>
+            </a:r>
+          </a:p>
+          <a:p>
+            <a:pPr algn="ctr"/>
+            <a:r>
+              <a:rPr lang="en-US" sz="1400" dirty="0">
+                <a:solidFill>
+                  <a:srgbClr val="0070C0"/>
+                </a:solidFill>
+              </a:rPr>
+              <a:t>“</a:t>
+            </a:r>
+            <a:r>
+              <a:rPr lang="en-US" sz="1400" dirty="0" err="1">
+                <a:solidFill>
+                  <a:srgbClr val="0070C0"/>
+                </a:solidFill>
+              </a:rPr>
+              <a:t>deletecustomer</a:t>
+            </a:r>
+            <a:r>
+              <a:rPr lang="en-US" sz="1400" dirty="0">
+                <a:solidFill>
+                  <a:srgbClr val="0070C0"/>
+                </a:solidFill>
+              </a:rPr>
+              <a:t> 1”)</a:t>
             </a:r>
           </a:p>
         </p:txBody>
@@ -4376,8 +4407,8 @@
         </p:nvSpPr>
         <p:spPr>
           <a:xfrm>
-            <a:off x="4371378" y="3150453"/>
-            <a:ext cx="1228707" cy="215444"/>
+            <a:off x="4203434" y="3150453"/>
+            <a:ext cx="1486782" cy="215444"/>
           </a:xfrm>
           <a:prstGeom prst="rect">
             <a:avLst/>
@@ -4397,7 +4428,7 @@
                   <a:srgbClr val="7030A0"/>
                 </a:solidFill>
               </a:rPr>
-              <a:t>deletePerson</a:t>
+              <a:t>deleteCustomer</a:t>
             </a:r>
             <a:r>
               <a:rPr lang="en-US" sz="1400" dirty="0">

</xml_diff>

<commit_message>
update the developer guide (diagram)
</commit_message>
<xml_diff>
--- a/docs/diagrams/LogicComponentSequenceDiagram.pptx
+++ b/docs/diagrams/LogicComponentSequenceDiagram.pptx
@@ -208,7 +208,7 @@
           <a:p>
             <a:fld id="{F5CC4B3F-88C1-4FFA-B1B6-F41C21DC6924}" type="datetimeFigureOut">
               <a:rPr lang="en-US" smtClean="0"/>
-              <a:t>3/22/19</a:t>
+              <a:t>4/2/19</a:t>
             </a:fld>
             <a:endParaRPr lang="en-US"/>
           </a:p>
@@ -738,7 +738,7 @@
           <a:p>
             <a:fld id="{78C97017-6FC3-485B-9764-EAC9E56C1D49}" type="datetimeFigureOut">
               <a:rPr lang="en-US" smtClean="0"/>
-              <a:t>3/22/19</a:t>
+              <a:t>4/2/19</a:t>
             </a:fld>
             <a:endParaRPr lang="en-US"/>
           </a:p>
@@ -906,7 +906,7 @@
           <a:p>
             <a:fld id="{78C97017-6FC3-485B-9764-EAC9E56C1D49}" type="datetimeFigureOut">
               <a:rPr lang="en-US" smtClean="0"/>
-              <a:t>3/22/19</a:t>
+              <a:t>4/2/19</a:t>
             </a:fld>
             <a:endParaRPr lang="en-US"/>
           </a:p>
@@ -1084,7 +1084,7 @@
           <a:p>
             <a:fld id="{78C97017-6FC3-485B-9764-EAC9E56C1D49}" type="datetimeFigureOut">
               <a:rPr lang="en-US" smtClean="0"/>
-              <a:t>3/22/19</a:t>
+              <a:t>4/2/19</a:t>
             </a:fld>
             <a:endParaRPr lang="en-US"/>
           </a:p>
@@ -1252,7 +1252,7 @@
           <a:p>
             <a:fld id="{78C97017-6FC3-485B-9764-EAC9E56C1D49}" type="datetimeFigureOut">
               <a:rPr lang="en-US" smtClean="0"/>
-              <a:t>3/22/19</a:t>
+              <a:t>4/2/19</a:t>
             </a:fld>
             <a:endParaRPr lang="en-US"/>
           </a:p>
@@ -1497,7 +1497,7 @@
           <a:p>
             <a:fld id="{78C97017-6FC3-485B-9764-EAC9E56C1D49}" type="datetimeFigureOut">
               <a:rPr lang="en-US" smtClean="0"/>
-              <a:t>3/22/19</a:t>
+              <a:t>4/2/19</a:t>
             </a:fld>
             <a:endParaRPr lang="en-US"/>
           </a:p>
@@ -1782,7 +1782,7 @@
           <a:p>
             <a:fld id="{78C97017-6FC3-485B-9764-EAC9E56C1D49}" type="datetimeFigureOut">
               <a:rPr lang="en-US" smtClean="0"/>
-              <a:t>3/22/19</a:t>
+              <a:t>4/2/19</a:t>
             </a:fld>
             <a:endParaRPr lang="en-US"/>
           </a:p>
@@ -2201,7 +2201,7 @@
           <a:p>
             <a:fld id="{78C97017-6FC3-485B-9764-EAC9E56C1D49}" type="datetimeFigureOut">
               <a:rPr lang="en-US" smtClean="0"/>
-              <a:t>3/22/19</a:t>
+              <a:t>4/2/19</a:t>
             </a:fld>
             <a:endParaRPr lang="en-US"/>
           </a:p>
@@ -2318,7 +2318,7 @@
           <a:p>
             <a:fld id="{78C97017-6FC3-485B-9764-EAC9E56C1D49}" type="datetimeFigureOut">
               <a:rPr lang="en-US" smtClean="0"/>
-              <a:t>3/22/19</a:t>
+              <a:t>4/2/19</a:t>
             </a:fld>
             <a:endParaRPr lang="en-US"/>
           </a:p>
@@ -2413,7 +2413,7 @@
           <a:p>
             <a:fld id="{78C97017-6FC3-485B-9764-EAC9E56C1D49}" type="datetimeFigureOut">
               <a:rPr lang="en-US" smtClean="0"/>
-              <a:t>3/22/19</a:t>
+              <a:t>4/2/19</a:t>
             </a:fld>
             <a:endParaRPr lang="en-US"/>
           </a:p>
@@ -2688,7 +2688,7 @@
           <a:p>
             <a:fld id="{78C97017-6FC3-485B-9764-EAC9E56C1D49}" type="datetimeFigureOut">
               <a:rPr lang="en-US" smtClean="0"/>
-              <a:t>3/22/19</a:t>
+              <a:t>4/2/19</a:t>
             </a:fld>
             <a:endParaRPr lang="en-US"/>
           </a:p>
@@ -2940,7 +2940,7 @@
           <a:p>
             <a:fld id="{78C97017-6FC3-485B-9764-EAC9E56C1D49}" type="datetimeFigureOut">
               <a:rPr lang="en-US" smtClean="0"/>
-              <a:t>3/22/19</a:t>
+              <a:t>4/2/19</a:t>
             </a:fld>
             <a:endParaRPr lang="en-US"/>
           </a:p>
@@ -3151,7 +3151,7 @@
           <a:p>
             <a:fld id="{78C97017-6FC3-485B-9764-EAC9E56C1D49}" type="datetimeFigureOut">
               <a:rPr lang="en-US" smtClean="0"/>
-              <a:t>3/22/19</a:t>
+              <a:t>4/2/19</a:t>
             </a:fld>
             <a:endParaRPr lang="en-US"/>
           </a:p>
@@ -4237,7 +4237,7 @@
         <p:spPr>
           <a:xfrm>
             <a:off x="1073520" y="3013971"/>
-            <a:ext cx="1312737" cy="430887"/>
+            <a:ext cx="1312737" cy="215444"/>
           </a:xfrm>
           <a:prstGeom prst="rect">
             <a:avLst/>
@@ -4257,7 +4257,7 @@
             </a:r>
             <a:r>
               <a:rPr lang="en-US" sz="1400" dirty="0"/>
-              <a:t> n/Alice</a:t>
+              <a:t> 1</a:t>
             </a:r>
           </a:p>
         </p:txBody>
@@ -4308,8 +4308,8 @@
         </p:nvSpPr>
         <p:spPr>
           <a:xfrm>
-            <a:off x="2485908" y="3082866"/>
-            <a:ext cx="1562949" cy="430887"/>
+            <a:off x="2386257" y="3089678"/>
+            <a:ext cx="1801134" cy="430887"/>
           </a:xfrm>
           <a:prstGeom prst="rect">
             <a:avLst/>
@@ -4329,7 +4329,18 @@
                   <a:srgbClr val="0070C0"/>
                 </a:solidFill>
               </a:rPr>
-              <a:t>execute(“</a:t>
+              <a:t>Execute</a:t>
+            </a:r>
+          </a:p>
+          <a:p>
+            <a:pPr algn="ctr"/>
+            <a:r>
+              <a:rPr lang="en-US" sz="1400" dirty="0">
+                <a:solidFill>
+                  <a:srgbClr val="0070C0"/>
+                </a:solidFill>
+              </a:rPr>
+              <a:t>(“</a:t>
             </a:r>
             <a:r>
               <a:rPr lang="en-US" sz="1400" dirty="0" err="1">
@@ -4345,7 +4356,7 @@
                   <a:srgbClr val="0070C0"/>
                 </a:solidFill>
               </a:rPr>
-              <a:t> n/Alice”)</a:t>
+              <a:t> 1”)</a:t>
             </a:r>
           </a:p>
         </p:txBody>
@@ -4396,8 +4407,8 @@
         </p:nvSpPr>
         <p:spPr>
           <a:xfrm>
-            <a:off x="4371378" y="3150453"/>
-            <a:ext cx="1228707" cy="430887"/>
+            <a:off x="4215722" y="3165213"/>
+            <a:ext cx="1442248" cy="215444"/>
           </a:xfrm>
           <a:prstGeom prst="rect">
             <a:avLst/>
@@ -4425,18 +4436,7 @@
                   <a:srgbClr val="7030A0"/>
                 </a:solidFill>
               </a:rPr>
-              <a:t>(</a:t>
-            </a:r>
-          </a:p>
-          <a:p>
-            <a:pPr algn="ctr"/>
-            <a:r>
-              <a:rPr lang="en-US" sz="1400" dirty="0">
-                <a:solidFill>
-                  <a:srgbClr val="7030A0"/>
-                </a:solidFill>
-              </a:rPr>
-              <a:t>“Alice”)</a:t>
+              <a:t>(“Alice”)</a:t>
             </a:r>
           </a:p>
         </p:txBody>

</xml_diff>

<commit_message>
update ug and dg update ui png update ui with labels update and add more ss, uml diagrams
</commit_message>
<xml_diff>
--- a/docs/diagrams/LogicComponentSequenceDiagram.pptx
+++ b/docs/diagrams/LogicComponentSequenceDiagram.pptx
@@ -208,7 +208,7 @@
           <a:p>
             <a:fld id="{F5CC4B3F-88C1-4FFA-B1B6-F41C21DC6924}" type="datetimeFigureOut">
               <a:rPr lang="en-US" smtClean="0"/>
-              <a:t>12/15/2018</a:t>
+              <a:t>4/6/19</a:t>
             </a:fld>
             <a:endParaRPr lang="en-US"/>
           </a:p>
@@ -738,7 +738,7 @@
           <a:p>
             <a:fld id="{78C97017-6FC3-485B-9764-EAC9E56C1D49}" type="datetimeFigureOut">
               <a:rPr lang="en-US" smtClean="0"/>
-              <a:t>12/15/2018</a:t>
+              <a:t>4/6/19</a:t>
             </a:fld>
             <a:endParaRPr lang="en-US"/>
           </a:p>
@@ -906,7 +906,7 @@
           <a:p>
             <a:fld id="{78C97017-6FC3-485B-9764-EAC9E56C1D49}" type="datetimeFigureOut">
               <a:rPr lang="en-US" smtClean="0"/>
-              <a:t>12/15/2018</a:t>
+              <a:t>4/6/19</a:t>
             </a:fld>
             <a:endParaRPr lang="en-US"/>
           </a:p>
@@ -1084,7 +1084,7 @@
           <a:p>
             <a:fld id="{78C97017-6FC3-485B-9764-EAC9E56C1D49}" type="datetimeFigureOut">
               <a:rPr lang="en-US" smtClean="0"/>
-              <a:t>12/15/2018</a:t>
+              <a:t>4/6/19</a:t>
             </a:fld>
             <a:endParaRPr lang="en-US"/>
           </a:p>
@@ -1252,7 +1252,7 @@
           <a:p>
             <a:fld id="{78C97017-6FC3-485B-9764-EAC9E56C1D49}" type="datetimeFigureOut">
               <a:rPr lang="en-US" smtClean="0"/>
-              <a:t>12/15/2018</a:t>
+              <a:t>4/6/19</a:t>
             </a:fld>
             <a:endParaRPr lang="en-US"/>
           </a:p>
@@ -1497,7 +1497,7 @@
           <a:p>
             <a:fld id="{78C97017-6FC3-485B-9764-EAC9E56C1D49}" type="datetimeFigureOut">
               <a:rPr lang="en-US" smtClean="0"/>
-              <a:t>12/15/2018</a:t>
+              <a:t>4/6/19</a:t>
             </a:fld>
             <a:endParaRPr lang="en-US"/>
           </a:p>
@@ -1782,7 +1782,7 @@
           <a:p>
             <a:fld id="{78C97017-6FC3-485B-9764-EAC9E56C1D49}" type="datetimeFigureOut">
               <a:rPr lang="en-US" smtClean="0"/>
-              <a:t>12/15/2018</a:t>
+              <a:t>4/6/19</a:t>
             </a:fld>
             <a:endParaRPr lang="en-US"/>
           </a:p>
@@ -2201,7 +2201,7 @@
           <a:p>
             <a:fld id="{78C97017-6FC3-485B-9764-EAC9E56C1D49}" type="datetimeFigureOut">
               <a:rPr lang="en-US" smtClean="0"/>
-              <a:t>12/15/2018</a:t>
+              <a:t>4/6/19</a:t>
             </a:fld>
             <a:endParaRPr lang="en-US"/>
           </a:p>
@@ -2318,7 +2318,7 @@
           <a:p>
             <a:fld id="{78C97017-6FC3-485B-9764-EAC9E56C1D49}" type="datetimeFigureOut">
               <a:rPr lang="en-US" smtClean="0"/>
-              <a:t>12/15/2018</a:t>
+              <a:t>4/6/19</a:t>
             </a:fld>
             <a:endParaRPr lang="en-US"/>
           </a:p>
@@ -2413,7 +2413,7 @@
           <a:p>
             <a:fld id="{78C97017-6FC3-485B-9764-EAC9E56C1D49}" type="datetimeFigureOut">
               <a:rPr lang="en-US" smtClean="0"/>
-              <a:t>12/15/2018</a:t>
+              <a:t>4/6/19</a:t>
             </a:fld>
             <a:endParaRPr lang="en-US"/>
           </a:p>
@@ -2688,7 +2688,7 @@
           <a:p>
             <a:fld id="{78C97017-6FC3-485B-9764-EAC9E56C1D49}" type="datetimeFigureOut">
               <a:rPr lang="en-US" smtClean="0"/>
-              <a:t>12/15/2018</a:t>
+              <a:t>4/6/19</a:t>
             </a:fld>
             <a:endParaRPr lang="en-US"/>
           </a:p>
@@ -2940,7 +2940,7 @@
           <a:p>
             <a:fld id="{78C97017-6FC3-485B-9764-EAC9E56C1D49}" type="datetimeFigureOut">
               <a:rPr lang="en-US" smtClean="0"/>
-              <a:t>12/15/2018</a:t>
+              <a:t>4/6/19</a:t>
             </a:fld>
             <a:endParaRPr lang="en-US"/>
           </a:p>
@@ -3151,7 +3151,7 @@
           <a:p>
             <a:fld id="{78C97017-6FC3-485B-9764-EAC9E56C1D49}" type="datetimeFigureOut">
               <a:rPr lang="en-US" smtClean="0"/>
-              <a:t>12/15/2018</a:t>
+              <a:t>4/6/19</a:t>
             </a:fld>
             <a:endParaRPr lang="en-US"/>
           </a:p>
@@ -4376,8 +4376,8 @@
         </p:nvSpPr>
         <p:spPr>
           <a:xfrm>
-            <a:off x="4371378" y="3150453"/>
-            <a:ext cx="1228707" cy="215444"/>
+            <a:off x="4238206" y="3150453"/>
+            <a:ext cx="1361880" cy="184666"/>
           </a:xfrm>
           <a:prstGeom prst="rect">
             <a:avLst/>
@@ -4392,20 +4392,20 @@
           <a:p>
             <a:pPr algn="ctr"/>
             <a:r>
-              <a:rPr lang="en-US" sz="1400" dirty="0" err="1">
+              <a:rPr lang="en-US" sz="1200" dirty="0" err="1">
                 <a:solidFill>
                   <a:srgbClr val="7030A0"/>
                 </a:solidFill>
               </a:rPr>
-              <a:t>deletePerson</a:t>
-            </a:r>
-            <a:r>
-              <a:rPr lang="en-US" sz="1400" dirty="0">
+              <a:t>deleteEquipment</a:t>
+            </a:r>
+            <a:r>
+              <a:rPr lang="en-US" sz="1200" dirty="0">
                 <a:solidFill>
                   <a:srgbClr val="7030A0"/>
                 </a:solidFill>
               </a:rPr>
-              <a:t>(p)</a:t>
+              <a:t>(e)</a:t>
             </a:r>
           </a:p>
         </p:txBody>
@@ -4740,8 +4740,8 @@
         </p:nvSpPr>
         <p:spPr>
           <a:xfrm>
-            <a:off x="4484157" y="3921005"/>
-            <a:ext cx="2466828" cy="215444"/>
+            <a:off x="4500045" y="3921005"/>
+            <a:ext cx="2728358" cy="430887"/>
           </a:xfrm>
           <a:prstGeom prst="rect">
             <a:avLst/>
@@ -4755,16 +4755,6 @@
           <a:lstStyle/>
           <a:p>
             <a:pPr algn="ctr"/>
-            <a:r>
-              <a:rPr lang="en-US" sz="1400" dirty="0" err="1">
-                <a:solidFill>
-                  <a:schemeClr val="accent6">
-                    <a:lumMod val="75000"/>
-                  </a:schemeClr>
-                </a:solidFill>
-              </a:rPr>
-              <a:t>saveAddressBook</a:t>
-            </a:r>
             <a:r>
               <a:rPr lang="en-US" sz="1400" dirty="0">
                 <a:solidFill>
@@ -4773,27 +4763,7 @@
                   </a:schemeClr>
                 </a:solidFill>
               </a:rPr>
-              <a:t>(</a:t>
-            </a:r>
-            <a:r>
-              <a:rPr lang="en-US" sz="1400" dirty="0" err="1">
-                <a:solidFill>
-                  <a:schemeClr val="accent6">
-                    <a:lumMod val="75000"/>
-                  </a:schemeClr>
-                </a:solidFill>
-              </a:rPr>
-              <a:t>AddressBook</a:t>
-            </a:r>
-            <a:r>
-              <a:rPr lang="en-US" sz="1400" dirty="0">
-                <a:solidFill>
-                  <a:schemeClr val="accent6">
-                    <a:lumMod val="75000"/>
-                  </a:schemeClr>
-                </a:solidFill>
-              </a:rPr>
-              <a:t>)</a:t>
+              <a:t>saveEquipmentManager(EquipmentManager)</a:t>
             </a:r>
           </a:p>
         </p:txBody>

</xml_diff>

<commit_message>
Tiny bugs like space errors in command examples fixed. UG updated. DG updated.
</commit_message>
<xml_diff>
--- a/docs/diagrams/LogicComponentSequenceDiagram.pptx
+++ b/docs/diagrams/LogicComponentSequenceDiagram.pptx
@@ -208,7 +208,7 @@
           <a:p>
             <a:fld id="{F5CC4B3F-88C1-4FFA-B1B6-F41C21DC6924}" type="datetimeFigureOut">
               <a:rPr lang="en-US" smtClean="0"/>
-              <a:t>4/3/19</a:t>
+              <a:t>4/13/19</a:t>
             </a:fld>
             <a:endParaRPr lang="en-US"/>
           </a:p>
@@ -738,7 +738,7 @@
           <a:p>
             <a:fld id="{78C97017-6FC3-485B-9764-EAC9E56C1D49}" type="datetimeFigureOut">
               <a:rPr lang="en-US" smtClean="0"/>
-              <a:t>4/3/19</a:t>
+              <a:t>4/13/19</a:t>
             </a:fld>
             <a:endParaRPr lang="en-US"/>
           </a:p>
@@ -906,7 +906,7 @@
           <a:p>
             <a:fld id="{78C97017-6FC3-485B-9764-EAC9E56C1D49}" type="datetimeFigureOut">
               <a:rPr lang="en-US" smtClean="0"/>
-              <a:t>4/3/19</a:t>
+              <a:t>4/13/19</a:t>
             </a:fld>
             <a:endParaRPr lang="en-US"/>
           </a:p>
@@ -1084,7 +1084,7 @@
           <a:p>
             <a:fld id="{78C97017-6FC3-485B-9764-EAC9E56C1D49}" type="datetimeFigureOut">
               <a:rPr lang="en-US" smtClean="0"/>
-              <a:t>4/3/19</a:t>
+              <a:t>4/13/19</a:t>
             </a:fld>
             <a:endParaRPr lang="en-US"/>
           </a:p>
@@ -1252,7 +1252,7 @@
           <a:p>
             <a:fld id="{78C97017-6FC3-485B-9764-EAC9E56C1D49}" type="datetimeFigureOut">
               <a:rPr lang="en-US" smtClean="0"/>
-              <a:t>4/3/19</a:t>
+              <a:t>4/13/19</a:t>
             </a:fld>
             <a:endParaRPr lang="en-US"/>
           </a:p>
@@ -1497,7 +1497,7 @@
           <a:p>
             <a:fld id="{78C97017-6FC3-485B-9764-EAC9E56C1D49}" type="datetimeFigureOut">
               <a:rPr lang="en-US" smtClean="0"/>
-              <a:t>4/3/19</a:t>
+              <a:t>4/13/19</a:t>
             </a:fld>
             <a:endParaRPr lang="en-US"/>
           </a:p>
@@ -1782,7 +1782,7 @@
           <a:p>
             <a:fld id="{78C97017-6FC3-485B-9764-EAC9E56C1D49}" type="datetimeFigureOut">
               <a:rPr lang="en-US" smtClean="0"/>
-              <a:t>4/3/19</a:t>
+              <a:t>4/13/19</a:t>
             </a:fld>
             <a:endParaRPr lang="en-US"/>
           </a:p>
@@ -2201,7 +2201,7 @@
           <a:p>
             <a:fld id="{78C97017-6FC3-485B-9764-EAC9E56C1D49}" type="datetimeFigureOut">
               <a:rPr lang="en-US" smtClean="0"/>
-              <a:t>4/3/19</a:t>
+              <a:t>4/13/19</a:t>
             </a:fld>
             <a:endParaRPr lang="en-US"/>
           </a:p>
@@ -2318,7 +2318,7 @@
           <a:p>
             <a:fld id="{78C97017-6FC3-485B-9764-EAC9E56C1D49}" type="datetimeFigureOut">
               <a:rPr lang="en-US" smtClean="0"/>
-              <a:t>4/3/19</a:t>
+              <a:t>4/13/19</a:t>
             </a:fld>
             <a:endParaRPr lang="en-US"/>
           </a:p>
@@ -2413,7 +2413,7 @@
           <a:p>
             <a:fld id="{78C97017-6FC3-485B-9764-EAC9E56C1D49}" type="datetimeFigureOut">
               <a:rPr lang="en-US" smtClean="0"/>
-              <a:t>4/3/19</a:t>
+              <a:t>4/13/19</a:t>
             </a:fld>
             <a:endParaRPr lang="en-US"/>
           </a:p>
@@ -2688,7 +2688,7 @@
           <a:p>
             <a:fld id="{78C97017-6FC3-485B-9764-EAC9E56C1D49}" type="datetimeFigureOut">
               <a:rPr lang="en-US" smtClean="0"/>
-              <a:t>4/3/19</a:t>
+              <a:t>4/13/19</a:t>
             </a:fld>
             <a:endParaRPr lang="en-US"/>
           </a:p>
@@ -2940,7 +2940,7 @@
           <a:p>
             <a:fld id="{78C97017-6FC3-485B-9764-EAC9E56C1D49}" type="datetimeFigureOut">
               <a:rPr lang="en-US" smtClean="0"/>
-              <a:t>4/3/19</a:t>
+              <a:t>4/13/19</a:t>
             </a:fld>
             <a:endParaRPr lang="en-US"/>
           </a:p>
@@ -3151,7 +3151,7 @@
           <a:p>
             <a:fld id="{78C97017-6FC3-485B-9764-EAC9E56C1D49}" type="datetimeFigureOut">
               <a:rPr lang="en-US" smtClean="0"/>
-              <a:t>4/3/19</a:t>
+              <a:t>4/13/19</a:t>
             </a:fld>
             <a:endParaRPr lang="en-US"/>
           </a:p>
@@ -4259,7 +4259,7 @@
         <p:spPr>
           <a:xfrm>
             <a:off x="968234" y="2989204"/>
-            <a:ext cx="1515617" cy="215444"/>
+            <a:ext cx="1515617" cy="184666"/>
           </a:xfrm>
           <a:prstGeom prst="rect">
             <a:avLst/>
@@ -4274,12 +4274,8 @@
           <a:p>
             <a:pPr algn="ctr"/>
             <a:r>
-              <a:rPr lang="en-US" sz="1400" dirty="0" err="1"/>
-              <a:t>deletecustomer</a:t>
-            </a:r>
-            <a:r>
-              <a:rPr lang="en-US" sz="1400" dirty="0"/>
-              <a:t> 1</a:t>
+              <a:rPr lang="en-US" sz="1200" dirty="0"/>
+              <a:t>delete-customer 1</a:t>
             </a:r>
           </a:p>
         </p:txBody>
@@ -4331,7 +4327,7 @@
         <p:spPr>
           <a:xfrm>
             <a:off x="2492258" y="3082866"/>
-            <a:ext cx="1542753" cy="430887"/>
+            <a:ext cx="1542753" cy="369332"/>
           </a:xfrm>
           <a:prstGeom prst="rect">
             <a:avLst/>
@@ -4346,7 +4342,7 @@
           <a:p>
             <a:pPr algn="ctr"/>
             <a:r>
-              <a:rPr lang="en-US" sz="1400" dirty="0">
+              <a:rPr lang="en-US" sz="1200" dirty="0">
                 <a:solidFill>
                   <a:srgbClr val="0070C0"/>
                 </a:solidFill>
@@ -4357,28 +4353,12 @@
           <a:p>
             <a:pPr algn="ctr"/>
             <a:r>
-              <a:rPr lang="en-US" sz="1400" dirty="0">
+              <a:rPr lang="en-US" sz="1200" dirty="0">
                 <a:solidFill>
                   <a:srgbClr val="0070C0"/>
                 </a:solidFill>
               </a:rPr>
-              <a:t>“</a:t>
-            </a:r>
-            <a:r>
-              <a:rPr lang="en-US" sz="1400" dirty="0" err="1">
-                <a:solidFill>
-                  <a:srgbClr val="0070C0"/>
-                </a:solidFill>
-              </a:rPr>
-              <a:t>deletecustomer</a:t>
-            </a:r>
-            <a:r>
-              <a:rPr lang="en-US" sz="1400" dirty="0">
-                <a:solidFill>
-                  <a:srgbClr val="0070C0"/>
-                </a:solidFill>
-              </a:rPr>
-              <a:t> 1”)</a:t>
+              <a:t>“delete-customer 1”)</a:t>
             </a:r>
           </a:p>
         </p:txBody>
@@ -4430,7 +4410,7 @@
         <p:spPr>
           <a:xfrm>
             <a:off x="4203434" y="3150453"/>
-            <a:ext cx="1486782" cy="430887"/>
+            <a:ext cx="1486782" cy="369332"/>
           </a:xfrm>
           <a:prstGeom prst="rect">
             <a:avLst/>
@@ -4445,44 +4425,23 @@
           <a:p>
             <a:pPr algn="ctr"/>
             <a:r>
-              <a:rPr lang="en-US" sz="1400" dirty="0" err="1">
+              <a:rPr lang="en-US" sz="1200" dirty="0">
                 <a:solidFill>
                   <a:srgbClr val="7030A0"/>
                 </a:solidFill>
               </a:rPr>
               <a:t>deleteCustomer</a:t>
             </a:r>
-            <a:endParaRPr lang="en-US" sz="1400" dirty="0">
-              <a:solidFill>
-                <a:srgbClr val="7030A0"/>
-              </a:solidFill>
-            </a:endParaRPr>
           </a:p>
           <a:p>
             <a:pPr algn="ctr"/>
             <a:r>
-              <a:rPr lang="en-US" sz="1400" dirty="0">
+              <a:rPr lang="en-US" sz="1200" dirty="0">
                 <a:solidFill>
                   <a:srgbClr val="7030A0"/>
                 </a:solidFill>
               </a:rPr>
-              <a:t>(</a:t>
-            </a:r>
-            <a:r>
-              <a:rPr lang="en-US" sz="1400" dirty="0" err="1">
-                <a:solidFill>
-                  <a:srgbClr val="7030A0"/>
-                </a:solidFill>
-              </a:rPr>
-              <a:t>customerToDelete</a:t>
-            </a:r>
-            <a:r>
-              <a:rPr lang="en-US" sz="1400" dirty="0">
-                <a:solidFill>
-                  <a:srgbClr val="7030A0"/>
-                </a:solidFill>
-              </a:rPr>
-              <a:t>)</a:t>
+              <a:t>(customerToDelete)</a:t>
             </a:r>
           </a:p>
         </p:txBody>
@@ -4818,7 +4777,7 @@
         <p:spPr>
           <a:xfrm>
             <a:off x="4484157" y="3921005"/>
-            <a:ext cx="2466828" cy="430887"/>
+            <a:ext cx="2466828" cy="400110"/>
           </a:xfrm>
           <a:prstGeom prst="rect">
             <a:avLst/>
@@ -4833,7 +4792,7 @@
           <a:p>
             <a:pPr algn="ctr"/>
             <a:r>
-              <a:rPr lang="en-US" sz="1400" dirty="0" err="1">
+              <a:rPr lang="en-US" sz="1200" dirty="0">
                 <a:solidFill>
                   <a:schemeClr val="accent6">
                     <a:lumMod val="75000"/>
@@ -4842,35 +4801,18 @@
               </a:rPr>
               <a:t>saveHotelManagementSystem</a:t>
             </a:r>
-            <a:endParaRPr lang="en-US" sz="1400" dirty="0">
-              <a:solidFill>
-                <a:schemeClr val="accent6">
-                  <a:lumMod val="75000"/>
-                </a:schemeClr>
-              </a:solidFill>
-            </a:endParaRPr>
           </a:p>
           <a:p>
             <a:pPr algn="ctr"/>
             <a:r>
-              <a:rPr lang="en-US" sz="1400" dirty="0">
+              <a:rPr lang="en-US" sz="1200" dirty="0">
                 <a:solidFill>
                   <a:schemeClr val="accent6">
                     <a:lumMod val="75000"/>
                   </a:schemeClr>
                 </a:solidFill>
               </a:rPr>
-              <a:t>(</a:t>
-            </a:r>
-            <a:r>
-              <a:rPr lang="en-US" sz="1400" dirty="0" err="1">
-                <a:solidFill>
-                  <a:schemeClr val="accent6">
-                    <a:lumMod val="75000"/>
-                  </a:schemeClr>
-                </a:solidFill>
-              </a:rPr>
-              <a:t>HotelManagementSystem</a:t>
+              <a:t>(HotelManagementSystem</a:t>
             </a:r>
             <a:r>
               <a:rPr lang="en-US" sz="1400" dirty="0">
@@ -5096,7 +5038,7 @@
         <p:spPr>
           <a:xfrm>
             <a:off x="7730090" y="3724480"/>
-            <a:ext cx="539047" cy="430887"/>
+            <a:ext cx="539047" cy="369332"/>
           </a:xfrm>
           <a:prstGeom prst="rect">
             <a:avLst/>
@@ -5110,7 +5052,7 @@
           <a:lstStyle/>
           <a:p>
             <a:r>
-              <a:rPr lang="en-US" sz="1400" dirty="0">
+              <a:rPr lang="en-US" sz="1200" dirty="0">
                 <a:solidFill>
                   <a:schemeClr val="accent6">
                     <a:lumMod val="75000"/>
@@ -5120,7 +5062,7 @@
               <a:t>Save </a:t>
             </a:r>
             <a:br>
-              <a:rPr lang="en-US" sz="1400" dirty="0">
+              <a:rPr lang="en-US" sz="1200" dirty="0">
                 <a:solidFill>
                   <a:schemeClr val="accent6">
                     <a:lumMod val="75000"/>
@@ -5129,7 +5071,7 @@
               </a:rPr>
             </a:br>
             <a:r>
-              <a:rPr lang="en-US" sz="1400" dirty="0">
+              <a:rPr lang="en-US" sz="1200" dirty="0">
                 <a:solidFill>
                   <a:schemeClr val="accent6">
                     <a:lumMod val="75000"/>

</xml_diff>